<commit_message>
Edições da minha entrega
</commit_message>
<xml_diff>
--- a/Sprint-14 Análise Estatica/CleartechSprint14.pptx
+++ b/Sprint-14 Análise Estatica/CleartechSprint14.pptx
@@ -14,6 +14,7 @@
     <p:sldId id="261" r:id="rId9"/>
     <p:sldId id="262" r:id="rId10"/>
     <p:sldId id="263" r:id="rId11"/>
+    <p:sldId id="264" r:id="rId12"/>
   </p:sldIdLst>
   <p:sldSz cx="12192000" cy="6858000"/>
   <p:notesSz cx="7559675" cy="10691813"/>
@@ -5455,8 +5456,8 @@
         </p:nvSpPr>
         <p:spPr>
           <a:xfrm>
-            <a:off x="360000" y="360000"/>
-            <a:ext cx="6819480" cy="3794040"/>
+            <a:off x="360720" y="360000"/>
+            <a:ext cx="7198920" cy="6350400"/>
           </a:xfrm>
           <a:prstGeom prst="rect">
             <a:avLst/>
@@ -5493,8 +5494,21 @@
                 <a:latin typeface="Verdana"/>
                 <a:ea typeface="Verdana"/>
               </a:rPr>
-              <a:t>Benefícios da Analise estática</a:t>
+              <a:t>Verificadores estáticos</a:t>
             </a:r>
+            <a:endParaRPr b="0" lang="pt-BR" sz="2400" spc="-1" strike="noStrike">
+              <a:solidFill>
+                <a:srgbClr val="000000"/>
+              </a:solidFill>
+              <a:latin typeface="Arial"/>
+            </a:endParaRPr>
+          </a:p>
+          <a:p>
+            <a:pPr>
+              <a:lnSpc>
+                <a:spcPct val="100000"/>
+              </a:lnSpc>
+            </a:pPr>
             <a:endParaRPr b="0" lang="pt-BR" sz="2400" spc="-1" strike="noStrike">
               <a:solidFill>
                 <a:srgbClr val="000000"/>
@@ -5519,21 +5533,8 @@
                 <a:latin typeface="Verdana"/>
                 <a:ea typeface="Verdana"/>
               </a:rPr>
-              <a:t>Facilidade de encontrar erros</a:t>
+              <a:t>	</a:t>
             </a:r>
-            <a:endParaRPr b="0" lang="pt-BR" sz="2100" spc="-1" strike="noStrike">
-              <a:solidFill>
-                <a:srgbClr val="000000"/>
-              </a:solidFill>
-              <a:latin typeface="Arial"/>
-            </a:endParaRPr>
-          </a:p>
-          <a:p>
-            <a:pPr>
-              <a:lnSpc>
-                <a:spcPct val="100000"/>
-              </a:lnSpc>
-            </a:pPr>
             <a:r>
               <a:rPr b="0" lang="pt-BR" sz="2100" spc="-1" strike="noStrike">
                 <a:solidFill>
@@ -5545,8 +5546,34 @@
                 <a:latin typeface="Verdana"/>
                 <a:ea typeface="Verdana"/>
               </a:rPr>
-              <a:t>Visão objetiva de onde pode ter falhado.</a:t>
+              <a:t>Style checker: verifica suas definições, estilo em que é programado.</a:t>
             </a:r>
+            <a:endParaRPr b="0" lang="pt-BR" sz="2100" spc="-1" strike="noStrike">
+              <a:solidFill>
+                <a:srgbClr val="000000"/>
+              </a:solidFill>
+              <a:latin typeface="Arial"/>
+            </a:endParaRPr>
+          </a:p>
+          <a:p>
+            <a:pPr>
+              <a:lnSpc>
+                <a:spcPct val="100000"/>
+              </a:lnSpc>
+            </a:pPr>
+            <a:endParaRPr b="0" lang="pt-BR" sz="2100" spc="-1" strike="noStrike">
+              <a:solidFill>
+                <a:srgbClr val="000000"/>
+              </a:solidFill>
+              <a:latin typeface="Arial"/>
+            </a:endParaRPr>
+          </a:p>
+          <a:p>
+            <a:pPr>
+              <a:lnSpc>
+                <a:spcPct val="100000"/>
+              </a:lnSpc>
+            </a:pPr>
             <a:endParaRPr b="0" lang="pt-BR" sz="2100" spc="-1" strike="noStrike">
               <a:solidFill>
                 <a:srgbClr val="000000"/>
@@ -5571,7 +5598,7 @@
                 <a:latin typeface="Verdana"/>
                 <a:ea typeface="Verdana"/>
               </a:rPr>
-              <a:t>Perspectiva diferente para facilitar estudos.</a:t>
+              <a:t>Bug checker: Como o nome mesmo diz ele verifica automaticamente  os  erros que possam existir.</a:t>
             </a:r>
             <a:endParaRPr b="0" lang="pt-BR" sz="2100" spc="-1" strike="noStrike">
               <a:solidFill>
@@ -5586,19 +5613,6 @@
                 <a:spcPct val="100000"/>
               </a:lnSpc>
             </a:pPr>
-            <a:r>
-              <a:rPr b="0" lang="pt-BR" sz="2100" spc="-1" strike="noStrike">
-                <a:solidFill>
-                  <a:srgbClr val="ffffff"/>
-                </a:solidFill>
-                <a:highlight>
-                  <a:srgbClr val="111111"/>
-                </a:highlight>
-                <a:latin typeface="Verdana"/>
-                <a:ea typeface="Verdana"/>
-              </a:rPr>
-              <a:t>Foco em outros tipos de eficiência, sabendo que eventuais erros são mitigados.</a:t>
-            </a:r>
             <a:endParaRPr b="0" lang="pt-BR" sz="2100" spc="-1" strike="noStrike">
               <a:solidFill>
                 <a:srgbClr val="000000"/>
@@ -5625,45 +5639,6 @@
                 <a:spcPct val="100000"/>
               </a:lnSpc>
             </a:pPr>
-            <a:r>
-              <a:rPr b="1" lang="pt-BR" sz="2400" spc="-1" strike="noStrike">
-                <a:solidFill>
-                  <a:srgbClr val="ffff00"/>
-                </a:solidFill>
-                <a:highlight>
-                  <a:srgbClr val="111111"/>
-                </a:highlight>
-                <a:latin typeface="Verdana"/>
-                <a:ea typeface="Verdana"/>
-              </a:rPr>
-              <a:t>Algumas métricas medidas pela Analise estática</a:t>
-            </a:r>
-            <a:endParaRPr b="0" lang="pt-BR" sz="2400" spc="-1" strike="noStrike">
-              <a:solidFill>
-                <a:srgbClr val="000000"/>
-              </a:solidFill>
-              <a:latin typeface="Arial"/>
-            </a:endParaRPr>
-          </a:p>
-          <a:p>
-            <a:pPr>
-              <a:lnSpc>
-                <a:spcPct val="100000"/>
-              </a:lnSpc>
-            </a:pPr>
-            <a:r>
-              <a:rPr b="0" lang="pt-BR" sz="2100" spc="-1" strike="noStrike">
-                <a:solidFill>
-                  <a:srgbClr val="ffffff"/>
-                </a:solidFill>
-                <a:highlight>
-                  <a:srgbClr val="111111"/>
-                </a:highlight>
-                <a:latin typeface="Verdana"/>
-                <a:ea typeface="Verdana"/>
-              </a:rPr>
-              <a:t>Números de linhas de código</a:t>
-            </a:r>
             <a:endParaRPr b="0" lang="pt-BR" sz="2100" spc="-1" strike="noStrike">
               <a:solidFill>
                 <a:srgbClr val="000000"/>
@@ -5677,19 +5652,6 @@
                 <a:spcPct val="100000"/>
               </a:lnSpc>
             </a:pPr>
-            <a:r>
-              <a:rPr b="0" lang="pt-BR" sz="2100" spc="-1" strike="noStrike">
-                <a:solidFill>
-                  <a:srgbClr val="ffffff"/>
-                </a:solidFill>
-                <a:highlight>
-                  <a:srgbClr val="111111"/>
-                </a:highlight>
-                <a:latin typeface="Verdana"/>
-                <a:ea typeface="Verdana"/>
-              </a:rPr>
-              <a:t>Complexidade ciclomática- mede caminhos independentes que tenham pelo menos uma aresta que ainda não tenha sido percorrida por nenhum outro caminho(pode determinar quais testes vem depois).</a:t>
-            </a:r>
             <a:endParaRPr b="0" lang="pt-BR" sz="2100" spc="-1" strike="noStrike">
               <a:solidFill>
                 <a:srgbClr val="000000"/>
@@ -5703,19 +5665,19 @@
                 <a:spcPct val="100000"/>
               </a:lnSpc>
             </a:pPr>
-            <a:r>
-              <a:rPr b="0" lang="pt-BR" sz="2100" spc="-1" strike="noStrike">
-                <a:solidFill>
-                  <a:srgbClr val="ffffff"/>
-                </a:solidFill>
-                <a:highlight>
-                  <a:srgbClr val="111111"/>
-                </a:highlight>
-                <a:latin typeface="Verdana"/>
-                <a:ea typeface="Verdana"/>
-              </a:rPr>
-              <a:t>Falta de coesão em métodos.</a:t>
-            </a:r>
+            <a:endParaRPr b="0" lang="pt-BR" sz="2100" spc="-1" strike="noStrike">
+              <a:solidFill>
+                <a:srgbClr val="000000"/>
+              </a:solidFill>
+              <a:latin typeface="Arial"/>
+            </a:endParaRPr>
+          </a:p>
+          <a:p>
+            <a:pPr>
+              <a:lnSpc>
+                <a:spcPct val="100000"/>
+              </a:lnSpc>
+            </a:pPr>
             <a:endParaRPr b="0" lang="pt-BR" sz="2100" spc="-1" strike="noStrike">
               <a:solidFill>
                 <a:srgbClr val="000000"/>
@@ -5814,7 +5776,7 @@
                 <a:latin typeface="Verdana"/>
                 <a:ea typeface="Verdana"/>
               </a:rPr>
-              <a:t>Rules</a:t>
+              <a:t>Benefícios da Analise estática</a:t>
             </a:r>
             <a:endParaRPr b="0" lang="pt-BR" sz="2400" spc="-1" strike="noStrike">
               <a:solidFill>
@@ -5840,8 +5802,21 @@
                 <a:latin typeface="Verdana"/>
                 <a:ea typeface="Verdana"/>
               </a:rPr>
-              <a:t>	</a:t>
+              <a:t>Facilidade de encontrar erros</a:t>
             </a:r>
+            <a:endParaRPr b="0" lang="pt-BR" sz="2100" spc="-1" strike="noStrike">
+              <a:solidFill>
+                <a:srgbClr val="000000"/>
+              </a:solidFill>
+              <a:latin typeface="Arial"/>
+            </a:endParaRPr>
+          </a:p>
+          <a:p>
+            <a:pPr>
+              <a:lnSpc>
+                <a:spcPct val="100000"/>
+              </a:lnSpc>
+            </a:pPr>
             <a:r>
               <a:rPr b="0" lang="pt-BR" sz="2100" spc="-1" strike="noStrike">
                 <a:solidFill>
@@ -5853,7 +5828,7 @@
                 <a:latin typeface="Verdana"/>
                 <a:ea typeface="Verdana"/>
               </a:rPr>
-              <a:t>Regras especificas de cada análise que encontra e categoriza os code smells.</a:t>
+              <a:t>Visão objetiva de onde pode ter falhado.</a:t>
             </a:r>
             <a:endParaRPr b="0" lang="pt-BR" sz="2100" spc="-1" strike="noStrike">
               <a:solidFill>
@@ -5879,7 +5854,33 @@
                 <a:latin typeface="Verdana"/>
                 <a:ea typeface="Verdana"/>
               </a:rPr>
-              <a:t>Estas ferramentas possibilitam as empresas ativar e inativar estas regras ou ate mesmo inserir suas próprias regras se assim acharem necessário.</a:t>
+              <a:t>Perspectiva diferente para facilitar estudos.</a:t>
+            </a:r>
+            <a:endParaRPr b="0" lang="pt-BR" sz="2100" spc="-1" strike="noStrike">
+              <a:solidFill>
+                <a:srgbClr val="000000"/>
+              </a:solidFill>
+              <a:latin typeface="Arial"/>
+            </a:endParaRPr>
+          </a:p>
+          <a:p>
+            <a:pPr>
+              <a:lnSpc>
+                <a:spcPct val="100000"/>
+              </a:lnSpc>
+            </a:pPr>
+            <a:r>
+              <a:rPr b="0" lang="pt-BR" sz="2100" spc="-1" strike="noStrike">
+                <a:solidFill>
+                  <a:srgbClr val="ffffff"/>
+                </a:solidFill>
+                <a:highlight>
+                  <a:srgbClr val="111111"/>
+                </a:highlight>
+                <a:latin typeface="Verdana"/>
+                <a:ea typeface="Verdana"/>
+              </a:rPr>
+              <a:t>Foco em outros tipos de eficiência, sabendo que eventuais erros são mitigados.</a:t>
             </a:r>
             <a:endParaRPr b="0" lang="pt-BR" sz="2100" spc="-1" strike="noStrike">
               <a:solidFill>
@@ -5918,7 +5919,7 @@
                 <a:latin typeface="Verdana"/>
                 <a:ea typeface="Verdana"/>
               </a:rPr>
-              <a:t>Code Smell</a:t>
+              <a:t>Algumas métricas medidas pela Analise estática</a:t>
             </a:r>
             <a:endParaRPr b="0" lang="pt-BR" sz="2400" spc="-1" strike="noStrike">
               <a:solidFill>
@@ -5934,7 +5935,7 @@
               </a:lnSpc>
             </a:pPr>
             <a:r>
-              <a:rPr b="0" lang="pt-BR" sz="2400" spc="-1" strike="noStrike">
+              <a:rPr b="0" lang="pt-BR" sz="2100" spc="-1" strike="noStrike">
                 <a:solidFill>
                   <a:srgbClr val="ffffff"/>
                 </a:solidFill>
@@ -5944,10 +5945,23 @@
                 <a:latin typeface="Verdana"/>
                 <a:ea typeface="Verdana"/>
               </a:rPr>
-              <a:t>	</a:t>
+              <a:t>Números de linhas de código</a:t>
             </a:r>
+            <a:endParaRPr b="0" lang="pt-BR" sz="2100" spc="-1" strike="noStrike">
+              <a:solidFill>
+                <a:srgbClr val="000000"/>
+              </a:solidFill>
+              <a:latin typeface="Arial"/>
+            </a:endParaRPr>
+          </a:p>
+          <a:p>
+            <a:pPr>
+              <a:lnSpc>
+                <a:spcPct val="100000"/>
+              </a:lnSpc>
+            </a:pPr>
             <a:r>
-              <a:rPr b="0" lang="pt-BR" sz="2400" spc="-1" strike="noStrike">
+              <a:rPr b="0" lang="pt-BR" sz="2100" spc="-1" strike="noStrike">
                 <a:solidFill>
                   <a:srgbClr val="ffffff"/>
                 </a:solidFill>
@@ -5957,9 +5971,48 @@
                 <a:latin typeface="Verdana"/>
                 <a:ea typeface="Verdana"/>
               </a:rPr>
-              <a:t>O code smell significa o cheiro de código, ou seja de algo que precisa ser melhorado as falhas que são encontradas no sistema que são sempre a causa de outras falhas existentes  e que podem piorar ainda mais a situação se não são resolvidas.</a:t>
+              <a:t>Complexidade ciclomática- mede caminhos independentes que tenham pelo menos uma aresta que ainda não tenha sido percorrida por nenhum outro caminho(pode determinar quais testes vem depois).</a:t>
             </a:r>
-            <a:endParaRPr b="0" lang="pt-BR" sz="2400" spc="-1" strike="noStrike">
+            <a:endParaRPr b="0" lang="pt-BR" sz="2100" spc="-1" strike="noStrike">
+              <a:solidFill>
+                <a:srgbClr val="000000"/>
+              </a:solidFill>
+              <a:latin typeface="Arial"/>
+            </a:endParaRPr>
+          </a:p>
+          <a:p>
+            <a:pPr>
+              <a:lnSpc>
+                <a:spcPct val="100000"/>
+              </a:lnSpc>
+            </a:pPr>
+            <a:r>
+              <a:rPr b="0" lang="pt-BR" sz="2100" spc="-1" strike="noStrike">
+                <a:solidFill>
+                  <a:srgbClr val="ffffff"/>
+                </a:solidFill>
+                <a:highlight>
+                  <a:srgbClr val="111111"/>
+                </a:highlight>
+                <a:latin typeface="Verdana"/>
+                <a:ea typeface="Verdana"/>
+              </a:rPr>
+              <a:t>Falta de coesão em métodos.</a:t>
+            </a:r>
+            <a:endParaRPr b="0" lang="pt-BR" sz="2100" spc="-1" strike="noStrike">
+              <a:solidFill>
+                <a:srgbClr val="000000"/>
+              </a:solidFill>
+              <a:latin typeface="Arial"/>
+            </a:endParaRPr>
+          </a:p>
+          <a:p>
+            <a:pPr>
+              <a:lnSpc>
+                <a:spcPct val="100000"/>
+              </a:lnSpc>
+            </a:pPr>
+            <a:endParaRPr b="0" lang="pt-BR" sz="2100" spc="-1" strike="noStrike">
               <a:solidFill>
                 <a:srgbClr val="000000"/>
               </a:solidFill>
@@ -5998,39 +6051,16 @@
           <a:chExt cx="0" cy="0"/>
         </a:xfrm>
       </p:grpSpPr>
-      <p:pic>
-        <p:nvPicPr>
-          <p:cNvPr id="89" name="" descr=""/>
-          <p:cNvPicPr/>
-          <p:nvPr/>
-        </p:nvPicPr>
-        <p:blipFill>
-          <a:blip r:embed="rId1"/>
-          <a:stretch/>
-        </p:blipFill>
-        <p:spPr>
-          <a:xfrm>
-            <a:off x="1260000" y="1620000"/>
-            <a:ext cx="8998920" cy="3778920"/>
-          </a:xfrm>
-          <a:prstGeom prst="rect">
-            <a:avLst/>
-          </a:prstGeom>
-          <a:ln w="0">
-            <a:noFill/>
-          </a:ln>
-        </p:spPr>
-      </p:pic>
-      <p:sp>
-        <p:nvSpPr>
-          <p:cNvPr id="90" name=""/>
+      <p:sp>
+        <p:nvSpPr>
+          <p:cNvPr id="89" name=""/>
           <p:cNvSpPr/>
           <p:nvPr/>
         </p:nvSpPr>
         <p:spPr>
           <a:xfrm>
-            <a:off x="2039040" y="900000"/>
-            <a:ext cx="5519880" cy="460080"/>
+            <a:off x="360000" y="360000"/>
+            <a:ext cx="6819480" cy="3794040"/>
           </a:xfrm>
           <a:prstGeom prst="rect">
             <a:avLst/>
@@ -6067,7 +6097,150 @@
                 <a:latin typeface="Verdana"/>
                 <a:ea typeface="Verdana"/>
               </a:rPr>
-              <a:t>Exemplo de code smell</a:t>
+              <a:t>Rules</a:t>
+            </a:r>
+            <a:endParaRPr b="0" lang="pt-BR" sz="2400" spc="-1" strike="noStrike">
+              <a:solidFill>
+                <a:srgbClr val="000000"/>
+              </a:solidFill>
+              <a:latin typeface="Arial"/>
+            </a:endParaRPr>
+          </a:p>
+          <a:p>
+            <a:pPr>
+              <a:lnSpc>
+                <a:spcPct val="100000"/>
+              </a:lnSpc>
+            </a:pPr>
+            <a:r>
+              <a:rPr b="0" lang="pt-BR" sz="2100" spc="-1" strike="noStrike">
+                <a:solidFill>
+                  <a:srgbClr val="ffffff"/>
+                </a:solidFill>
+                <a:highlight>
+                  <a:srgbClr val="111111"/>
+                </a:highlight>
+                <a:latin typeface="Verdana"/>
+                <a:ea typeface="Verdana"/>
+              </a:rPr>
+              <a:t>	</a:t>
+            </a:r>
+            <a:r>
+              <a:rPr b="0" lang="pt-BR" sz="2100" spc="-1" strike="noStrike">
+                <a:solidFill>
+                  <a:srgbClr val="ffffff"/>
+                </a:solidFill>
+                <a:highlight>
+                  <a:srgbClr val="111111"/>
+                </a:highlight>
+                <a:latin typeface="Verdana"/>
+                <a:ea typeface="Verdana"/>
+              </a:rPr>
+              <a:t>Regras especificas de cada análise que encontra e categoriza os code smells.</a:t>
+            </a:r>
+            <a:endParaRPr b="0" lang="pt-BR" sz="2100" spc="-1" strike="noStrike">
+              <a:solidFill>
+                <a:srgbClr val="000000"/>
+              </a:solidFill>
+              <a:latin typeface="Arial"/>
+            </a:endParaRPr>
+          </a:p>
+          <a:p>
+            <a:pPr>
+              <a:lnSpc>
+                <a:spcPct val="100000"/>
+              </a:lnSpc>
+            </a:pPr>
+            <a:r>
+              <a:rPr b="0" lang="pt-BR" sz="2100" spc="-1" strike="noStrike">
+                <a:solidFill>
+                  <a:srgbClr val="ffffff"/>
+                </a:solidFill>
+                <a:highlight>
+                  <a:srgbClr val="111111"/>
+                </a:highlight>
+                <a:latin typeface="Verdana"/>
+                <a:ea typeface="Verdana"/>
+              </a:rPr>
+              <a:t>Estas ferramentas possibilitam as empresas ativar e inativar estas regras ou ate mesmo inserir suas próprias regras se assim acharem necessário.</a:t>
+            </a:r>
+            <a:endParaRPr b="0" lang="pt-BR" sz="2100" spc="-1" strike="noStrike">
+              <a:solidFill>
+                <a:srgbClr val="000000"/>
+              </a:solidFill>
+              <a:latin typeface="Arial"/>
+            </a:endParaRPr>
+          </a:p>
+          <a:p>
+            <a:pPr>
+              <a:lnSpc>
+                <a:spcPct val="100000"/>
+              </a:lnSpc>
+            </a:pPr>
+            <a:endParaRPr b="0" lang="pt-BR" sz="2100" spc="-1" strike="noStrike">
+              <a:solidFill>
+                <a:srgbClr val="000000"/>
+              </a:solidFill>
+              <a:latin typeface="Arial"/>
+            </a:endParaRPr>
+          </a:p>
+          <a:p>
+            <a:pPr>
+              <a:lnSpc>
+                <a:spcPct val="100000"/>
+              </a:lnSpc>
+            </a:pPr>
+            <a:r>
+              <a:rPr b="1" lang="pt-BR" sz="2400" spc="-1" strike="noStrike">
+                <a:solidFill>
+                  <a:srgbClr val="ffff00"/>
+                </a:solidFill>
+                <a:highlight>
+                  <a:srgbClr val="111111"/>
+                </a:highlight>
+                <a:latin typeface="Verdana"/>
+                <a:ea typeface="Verdana"/>
+              </a:rPr>
+              <a:t>Code Smell</a:t>
+            </a:r>
+            <a:endParaRPr b="0" lang="pt-BR" sz="2400" spc="-1" strike="noStrike">
+              <a:solidFill>
+                <a:srgbClr val="000000"/>
+              </a:solidFill>
+              <a:latin typeface="Arial"/>
+            </a:endParaRPr>
+          </a:p>
+          <a:p>
+            <a:pPr>
+              <a:lnSpc>
+                <a:spcPct val="100000"/>
+              </a:lnSpc>
+            </a:pPr>
+            <a:r>
+              <a:rPr b="0" lang="pt-BR" sz="2400" spc="-1" strike="noStrike">
+                <a:solidFill>
+                  <a:srgbClr val="ffffff"/>
+                </a:solidFill>
+                <a:highlight>
+                  <a:srgbClr val="111111"/>
+                </a:highlight>
+                <a:latin typeface="Verdana"/>
+                <a:ea typeface="Verdana"/>
+              </a:rPr>
+              <a:t>	</a:t>
+            </a:r>
+            <a:r>
+              <a:rPr b="0" lang="pt-BR" sz="2400" spc="-1" strike="noStrike">
+                <a:solidFill>
+                  <a:srgbClr val="ffffff"/>
+                </a:solidFill>
+                <a:highlight>
+                  <a:srgbClr val="111111"/>
+                </a:highlight>
+                <a:latin typeface="Verdana"/>
+                <a:ea typeface="Verdana"/>
+              </a:rPr>
+              <a:t>O code smell significa o cheiro de código, ou seja de algo que precisa ser melhorado as falhas que são encontradas no sistema que são sempre a causa de outras falhas existentes  e que podem piorar ainda mais a situação se não são resolvidas.</a:t>
             </a:r>
             <a:endParaRPr b="0" lang="pt-BR" sz="2400" spc="-1" strike="noStrike">
               <a:solidFill>
@@ -6108,6 +6281,29 @@
           <a:chExt cx="0" cy="0"/>
         </a:xfrm>
       </p:grpSpPr>
+      <p:pic>
+        <p:nvPicPr>
+          <p:cNvPr id="90" name="" descr=""/>
+          <p:cNvPicPr/>
+          <p:nvPr/>
+        </p:nvPicPr>
+        <p:blipFill>
+          <a:blip r:embed="rId1"/>
+          <a:stretch/>
+        </p:blipFill>
+        <p:spPr>
+          <a:xfrm>
+            <a:off x="1260000" y="1620000"/>
+            <a:ext cx="8998920" cy="3778920"/>
+          </a:xfrm>
+          <a:prstGeom prst="rect">
+            <a:avLst/>
+          </a:prstGeom>
+          <a:ln w="0">
+            <a:noFill/>
+          </a:ln>
+        </p:spPr>
+      </p:pic>
       <p:sp>
         <p:nvSpPr>
           <p:cNvPr id="91" name=""/>
@@ -6116,8 +6312,8 @@
         </p:nvSpPr>
         <p:spPr>
           <a:xfrm>
-            <a:off x="180000" y="720000"/>
-            <a:ext cx="9178920" cy="3423240"/>
+            <a:off x="2039040" y="900000"/>
+            <a:ext cx="5519880" cy="460080"/>
           </a:xfrm>
           <a:prstGeom prst="rect">
             <a:avLst/>
@@ -6154,59 +6350,7 @@
                 <a:latin typeface="Verdana"/>
                 <a:ea typeface="Verdana"/>
               </a:rPr>
-              <a:t>Conclusão.</a:t>
-            </a:r>
-            <a:endParaRPr b="0" lang="pt-BR" sz="2400" spc="-1" strike="noStrike">
-              <a:solidFill>
-                <a:srgbClr val="000000"/>
-              </a:solidFill>
-              <a:latin typeface="Arial"/>
-            </a:endParaRPr>
-          </a:p>
-          <a:p>
-            <a:pPr>
-              <a:lnSpc>
-                <a:spcPct val="100000"/>
-              </a:lnSpc>
-            </a:pPr>
-            <a:endParaRPr b="0" lang="pt-BR" sz="2400" spc="-1" strike="noStrike">
-              <a:solidFill>
-                <a:srgbClr val="000000"/>
-              </a:solidFill>
-              <a:latin typeface="Arial"/>
-            </a:endParaRPr>
-          </a:p>
-          <a:p>
-            <a:pPr>
-              <a:lnSpc>
-                <a:spcPct val="100000"/>
-              </a:lnSpc>
-            </a:pPr>
-            <a:r>
-              <a:rPr b="0" lang="pt-BR" sz="2400" spc="-1" strike="noStrike">
-                <a:solidFill>
-                  <a:srgbClr val="ffffff"/>
-                </a:solidFill>
-                <a:highlight>
-                  <a:srgbClr val="111111"/>
-                </a:highlight>
-                <a:latin typeface="Verdana"/>
-                <a:ea typeface="Verdana"/>
-              </a:rPr>
-              <a:t>	</a:t>
-            </a:r>
-            <a:r>
-              <a:rPr b="0" lang="pt-BR" sz="2400" spc="-1" strike="noStrike">
-                <a:solidFill>
-                  <a:srgbClr val="ffffff"/>
-                </a:solidFill>
-                <a:highlight>
-                  <a:srgbClr val="111111"/>
-                </a:highlight>
-                <a:latin typeface="Verdana"/>
-                <a:ea typeface="Verdana"/>
-              </a:rPr>
-              <a:t>Para  fazer uma entrega de qualidade sempre  se faz necessário  o  acompanhamento das entregas que são feitas, e a escolha de uma boa ferramenta garante a segurança necessária e através disso podemos obter  os relatórios que podem nos trazer feedbacks esperados com a precisão e agilidade suficientes para garantir a eficiência desta entrega. </a:t>
+              <a:t>Exemplo de code smell</a:t>
             </a:r>
             <a:endParaRPr b="0" lang="pt-BR" sz="2400" spc="-1" strike="noStrike">
               <a:solidFill>
@@ -6249,7 +6393,146 @@
       </p:grpSpPr>
       <p:sp>
         <p:nvSpPr>
-          <p:cNvPr id="92" name="CustomShape 1"/>
+          <p:cNvPr id="92" name=""/>
+          <p:cNvSpPr/>
+          <p:nvPr/>
+        </p:nvSpPr>
+        <p:spPr>
+          <a:xfrm>
+            <a:off x="180000" y="720000"/>
+            <a:ext cx="9178920" cy="3423240"/>
+          </a:xfrm>
+          <a:prstGeom prst="rect">
+            <a:avLst/>
+          </a:prstGeom>
+          <a:noFill/>
+          <a:ln w="0">
+            <a:noFill/>
+          </a:ln>
+        </p:spPr>
+        <p:style>
+          <a:lnRef idx="0"/>
+          <a:fillRef idx="0"/>
+          <a:effectRef idx="0"/>
+          <a:fontRef idx="minor"/>
+        </p:style>
+        <p:txBody>
+          <a:bodyPr lIns="90000" rIns="90000" tIns="45000" bIns="45000" anchor="t">
+            <a:noAutofit/>
+          </a:bodyPr>
+          <a:p>
+            <a:pPr>
+              <a:lnSpc>
+                <a:spcPct val="100000"/>
+              </a:lnSpc>
+            </a:pPr>
+            <a:r>
+              <a:rPr b="1" lang="pt-BR" sz="2400" spc="-1" strike="noStrike">
+                <a:solidFill>
+                  <a:srgbClr val="ffff00"/>
+                </a:solidFill>
+                <a:highlight>
+                  <a:srgbClr val="111111"/>
+                </a:highlight>
+                <a:latin typeface="Verdana"/>
+                <a:ea typeface="Verdana"/>
+              </a:rPr>
+              <a:t>Conclusão.</a:t>
+            </a:r>
+            <a:endParaRPr b="0" lang="pt-BR" sz="2400" spc="-1" strike="noStrike">
+              <a:solidFill>
+                <a:srgbClr val="000000"/>
+              </a:solidFill>
+              <a:latin typeface="Arial"/>
+            </a:endParaRPr>
+          </a:p>
+          <a:p>
+            <a:pPr>
+              <a:lnSpc>
+                <a:spcPct val="100000"/>
+              </a:lnSpc>
+            </a:pPr>
+            <a:endParaRPr b="0" lang="pt-BR" sz="2400" spc="-1" strike="noStrike">
+              <a:solidFill>
+                <a:srgbClr val="000000"/>
+              </a:solidFill>
+              <a:latin typeface="Arial"/>
+            </a:endParaRPr>
+          </a:p>
+          <a:p>
+            <a:pPr>
+              <a:lnSpc>
+                <a:spcPct val="100000"/>
+              </a:lnSpc>
+            </a:pPr>
+            <a:r>
+              <a:rPr b="0" lang="pt-BR" sz="2400" spc="-1" strike="noStrike">
+                <a:solidFill>
+                  <a:srgbClr val="ffffff"/>
+                </a:solidFill>
+                <a:highlight>
+                  <a:srgbClr val="111111"/>
+                </a:highlight>
+                <a:latin typeface="Verdana"/>
+                <a:ea typeface="Verdana"/>
+              </a:rPr>
+              <a:t>	</a:t>
+            </a:r>
+            <a:r>
+              <a:rPr b="0" lang="pt-BR" sz="2400" spc="-1" strike="noStrike">
+                <a:solidFill>
+                  <a:srgbClr val="ffffff"/>
+                </a:solidFill>
+                <a:highlight>
+                  <a:srgbClr val="111111"/>
+                </a:highlight>
+                <a:latin typeface="Verdana"/>
+                <a:ea typeface="Verdana"/>
+              </a:rPr>
+              <a:t>Para  fazer uma entrega de qualidade sempre  se faz necessário  o  acompanhamento das entregas que são feitas, e a escolha de uma boa ferramenta garante a segurança necessária e através disso podemos obter  os relatórios que podem nos trazer feedbacks esperados com a precisão e agilidade suficientes para garantir a eficiência desta entrega. </a:t>
+            </a:r>
+            <a:endParaRPr b="0" lang="pt-BR" sz="2400" spc="-1" strike="noStrike">
+              <a:solidFill>
+                <a:srgbClr val="000000"/>
+              </a:solidFill>
+              <a:latin typeface="Arial"/>
+            </a:endParaRPr>
+          </a:p>
+        </p:txBody>
+      </p:sp>
+    </p:spTree>
+  </p:cSld>
+  <mc:AlternateContent>
+    <mc:Choice Requires="p14">
+      <p:transition spd="slow" p14:dur="2000"/>
+    </mc:Choice>
+    <mc:Fallback>
+      <p:transition spd="slow"/>
+    </mc:Fallback>
+  </mc:AlternateContent>
+</p:sld>
+</file>
+
+<file path=ppt/slides/slide9.xml><?xml version="1.0" encoding="utf-8"?>
+<p:sld xmlns:a="http://schemas.openxmlformats.org/drawingml/2006/main" xmlns:p="http://schemas.openxmlformats.org/presentationml/2006/main" xmlns:r="http://schemas.openxmlformats.org/officeDocument/2006/relationships" xmlns:p14="http://schemas.microsoft.com/office/powerpoint/2010/main" xmlns:p15="http://schemas.microsoft.com/office/powerpoint/2012/main" xmlns:mc="http://schemas.openxmlformats.org/markup-compatibility/2006">
+  <p:cSld>
+    <p:spTree>
+      <p:nvGrpSpPr>
+        <p:cNvPr id="1" name=""/>
+        <p:cNvGrpSpPr/>
+        <p:nvPr/>
+      </p:nvGrpSpPr>
+      <p:grpSpPr>
+        <a:xfrm>
+          <a:off x="0" y="0"/>
+          <a:ext cx="0" cy="0"/>
+          <a:chOff x="0" y="0"/>
+          <a:chExt cx="0" cy="0"/>
+        </a:xfrm>
+      </p:grpSpPr>
+      <p:sp>
+        <p:nvSpPr>
+          <p:cNvPr id="93" name="CustomShape 1"/>
           <p:cNvSpPr/>
           <p:nvPr/>
         </p:nvSpPr>
@@ -6303,7 +6586,7 @@
       </p:sp>
       <p:sp>
         <p:nvSpPr>
-          <p:cNvPr id="93" name="CustomShape 2"/>
+          <p:cNvPr id="94" name="CustomShape 2"/>
           <p:cNvSpPr/>
           <p:nvPr/>
         </p:nvSpPr>
@@ -6357,7 +6640,7 @@
       </p:sp>
       <p:sp>
         <p:nvSpPr>
-          <p:cNvPr id="94" name="CustomShape 3"/>
+          <p:cNvPr id="95" name="CustomShape 3"/>
           <p:cNvSpPr/>
           <p:nvPr/>
         </p:nvSpPr>

</xml_diff>